<commit_message>
ppt finished and code comment in process
</commit_message>
<xml_diff>
--- a/report/cloud_slides_2.pptx
+++ b/report/cloud_slides_2.pptx
@@ -217,7 +217,7 @@
           <a:p>
             <a:fld id="{4DCEAADA-4C47-4769-B95E-71546FB5600D}" type="datetimeFigureOut">
               <a:rPr lang="fr-CH" smtClean="0"/>
-              <a:t>06.12.15</a:t>
+              <a:t>07.12.15</a:t>
             </a:fld>
             <a:endParaRPr lang="fr-CH"/>
           </a:p>
@@ -387,7 +387,7 @@
           <a:p>
             <a:fld id="{805956EA-FB26-4CDB-951C-46CB272907B1}" type="datetimeFigureOut">
               <a:rPr lang="fr-CH" smtClean="0"/>
-              <a:t>06.12.15</a:t>
+              <a:t>07.12.15</a:t>
             </a:fld>
             <a:endParaRPr lang="fr-CH"/>
           </a:p>
@@ -992,7 +992,7 @@
           <a:p>
             <a:fld id="{C43896F1-9A2E-4F71-89E3-643EA97C0F02}" type="datetime2">
               <a:rPr lang="en-US" smtClean="0"/>
-              <a:t>Sunday, December 6, 2015</a:t>
+              <a:t>Monday, December 7, 2015</a:t>
             </a:fld>
             <a:endParaRPr lang="en-US" dirty="0"/>
           </a:p>
@@ -1162,7 +1162,7 @@
           <a:p>
             <a:fld id="{2BFBE45F-92CC-4F98-A4F5-1B7E1EEDADC1}" type="datetime2">
               <a:rPr lang="en-US" smtClean="0"/>
-              <a:t>Sunday, December 6, 2015</a:t>
+              <a:t>Monday, December 7, 2015</a:t>
             </a:fld>
             <a:endParaRPr lang="en-US" dirty="0"/>
           </a:p>
@@ -1342,7 +1342,7 @@
           <a:p>
             <a:fld id="{9253D006-624A-41C7-9EAA-9B21AE424CDF}" type="datetime2">
               <a:rPr lang="en-US" smtClean="0"/>
-              <a:t>Sunday, December 6, 2015</a:t>
+              <a:t>Monday, December 7, 2015</a:t>
             </a:fld>
             <a:endParaRPr lang="en-US" dirty="0"/>
           </a:p>
@@ -1512,7 +1512,7 @@
           <a:p>
             <a:fld id="{567179FF-B5CF-4733-8008-E8A373DC24D9}" type="datetime2">
               <a:rPr lang="en-US" smtClean="0"/>
-              <a:t>Sunday, December 6, 2015</a:t>
+              <a:t>Monday, December 7, 2015</a:t>
             </a:fld>
             <a:endParaRPr lang="en-US" dirty="0"/>
           </a:p>
@@ -1770,7 +1770,7 @@
           <a:p>
             <a:fld id="{9187A9C2-E21B-41D0-8455-B6BF57E5AE7F}" type="datetime2">
               <a:rPr lang="en-US" smtClean="0"/>
-              <a:t>Sunday, December 6, 2015</a:t>
+              <a:t>Monday, December 7, 2015</a:t>
             </a:fld>
             <a:endParaRPr lang="en-US" dirty="0"/>
           </a:p>
@@ -2058,7 +2058,7 @@
           <a:p>
             <a:fld id="{6A96F99E-AC48-48BD-8C1A-75B6C67C6104}" type="datetime2">
               <a:rPr lang="en-US" smtClean="0"/>
-              <a:t>Sunday, December 6, 2015</a:t>
+              <a:t>Monday, December 7, 2015</a:t>
             </a:fld>
             <a:endParaRPr lang="en-US" dirty="0"/>
           </a:p>
@@ -2500,7 +2500,7 @@
           <a:p>
             <a:fld id="{1194FA40-D08B-4B3F-B107-23D1D5B3FE89}" type="datetime2">
               <a:rPr lang="en-US" smtClean="0"/>
-              <a:t>Sunday, December 6, 2015</a:t>
+              <a:t>Monday, December 7, 2015</a:t>
             </a:fld>
             <a:endParaRPr lang="en-US" dirty="0"/>
           </a:p>
@@ -2618,7 +2618,7 @@
           <a:p>
             <a:fld id="{09DF78F0-5814-41DC-B6D1-9E8866245516}" type="datetime2">
               <a:rPr lang="en-US" smtClean="0"/>
-              <a:t>Sunday, December 6, 2015</a:t>
+              <a:t>Monday, December 7, 2015</a:t>
             </a:fld>
             <a:endParaRPr lang="en-US" dirty="0"/>
           </a:p>
@@ -2713,7 +2713,7 @@
           <a:p>
             <a:fld id="{E6E1A52B-AB08-4F7D-8CD1-EA0BA34570BD}" type="datetime2">
               <a:rPr lang="en-US" smtClean="0"/>
-              <a:t>Sunday, December 6, 2015</a:t>
+              <a:t>Monday, December 7, 2015</a:t>
             </a:fld>
             <a:endParaRPr lang="en-US" dirty="0"/>
           </a:p>
@@ -3001,7 +3001,7 @@
           <a:p>
             <a:fld id="{30CC1928-570C-4688-952A-8DE1897F8447}" type="datetime2">
               <a:rPr lang="en-US" smtClean="0"/>
-              <a:t>Sunday, December 6, 2015</a:t>
+              <a:t>Monday, December 7, 2015</a:t>
             </a:fld>
             <a:endParaRPr lang="en-US" dirty="0"/>
           </a:p>
@@ -3274,7 +3274,7 @@
           <a:p>
             <a:fld id="{F4C5660A-A6AB-4500-9E97-BF71BAAF0F4D}" type="datetime2">
               <a:rPr lang="en-US" smtClean="0"/>
-              <a:t>Sunday, December 6, 2015</a:t>
+              <a:t>Monday, December 7, 2015</a:t>
             </a:fld>
             <a:endParaRPr lang="en-US" dirty="0"/>
           </a:p>
@@ -3571,7 +3571,7 @@
           <a:p>
             <a:fld id="{0CE8C90E-3B68-4D10-A118-2FAA124CC030}" type="datetime2">
               <a:rPr lang="en-US" smtClean="0"/>
-              <a:t>Sunday, December 6, 2015</a:t>
+              <a:t>Monday, December 7, 2015</a:t>
             </a:fld>
             <a:endParaRPr lang="en-US" dirty="0"/>
           </a:p>
@@ -4128,7 +4128,7 @@
             </a:br>
             <a:r>
               <a:rPr lang="fr-CH" b="1" dirty="0" err="1"/>
-              <a:t>i</a:t>
+              <a:t>I</a:t>
             </a:r>
             <a:r>
               <a:rPr lang="fr-CH" b="1" dirty="0" err="1" smtClean="0"/>
@@ -4251,46 +4251,22 @@
               </a:lnSpc>
             </a:pPr>
             <a:r>
+              <a:rPr lang="fr-CH" dirty="0" smtClean="0">
+                <a:latin typeface="Frutiger LT Std 55 Roman" charset="0"/>
+                <a:ea typeface="Frutiger LT Std 55 Roman" charset="0"/>
+                <a:cs typeface="Frutiger LT Std 55 Roman" charset="0"/>
+              </a:rPr>
+              <a:t>URL </a:t>
+            </a:r>
+            <a:r>
               <a:rPr lang="fr-CH" dirty="0" err="1" smtClean="0">
                 <a:latin typeface="Frutiger LT Std 55 Roman" charset="0"/>
                 <a:ea typeface="Frutiger LT Std 55 Roman" charset="0"/>
                 <a:cs typeface="Frutiger LT Std 55 Roman" charset="0"/>
               </a:rPr>
-              <a:t>Status</a:t>
-            </a:r>
-            <a:r>
-              <a:rPr lang="fr-CH" dirty="0" smtClean="0">
-                <a:latin typeface="Frutiger LT Std 55 Roman" charset="0"/>
-                <a:ea typeface="Frutiger LT Std 55 Roman" charset="0"/>
-                <a:cs typeface="Frutiger LT Std 55 Roman" charset="0"/>
-              </a:rPr>
-              <a:t> monitoring </a:t>
-            </a:r>
-            <a:r>
-              <a:rPr lang="fr-CH" dirty="0" err="1" smtClean="0">
-                <a:latin typeface="Frutiger LT Std 55 Roman" charset="0"/>
-                <a:ea typeface="Frutiger LT Std 55 Roman" charset="0"/>
-                <a:cs typeface="Frutiger LT Std 55 Roman" charset="0"/>
-              </a:rPr>
-              <a:t>based</a:t>
-            </a:r>
-            <a:r>
-              <a:rPr lang="fr-CH" dirty="0" smtClean="0">
-                <a:latin typeface="Frutiger LT Std 55 Roman" charset="0"/>
-                <a:ea typeface="Frutiger LT Std 55 Roman" charset="0"/>
-                <a:cs typeface="Frutiger LT Std 55 Roman" charset="0"/>
-              </a:rPr>
-              <a:t> on </a:t>
-            </a:r>
-            <a:r>
-              <a:rPr lang="fr-CH" dirty="0" err="1" smtClean="0">
-                <a:latin typeface="Frutiger LT Std 55 Roman" charset="0"/>
-                <a:ea typeface="Frutiger LT Std 55 Roman" charset="0"/>
-                <a:cs typeface="Frutiger LT Std 55 Roman" charset="0"/>
-              </a:rPr>
-              <a:t>Cloudwatch</a:t>
-            </a:r>
-            <a:endParaRPr lang="fr-CH" dirty="0">
+              <a:t>shortener</a:t>
+            </a:r>
+            <a:endParaRPr lang="fr-CH" dirty="0" smtClean="0">
               <a:latin typeface="Frutiger LT Std 55 Roman" charset="0"/>
               <a:ea typeface="Frutiger LT Std 55 Roman" charset="0"/>
               <a:cs typeface="Frutiger LT Std 55 Roman" charset="0"/>
@@ -4308,21 +4284,8 @@
                 <a:ea typeface="Frutiger LT Std 55 Roman" charset="0"/>
                 <a:cs typeface="Frutiger LT Std 55 Roman" charset="0"/>
               </a:rPr>
-              <a:t>URL </a:t>
-            </a:r>
-            <a:r>
-              <a:rPr lang="fr-CH" dirty="0" err="1" smtClean="0">
-                <a:latin typeface="Frutiger LT Std 55 Roman" charset="0"/>
-                <a:ea typeface="Frutiger LT Std 55 Roman" charset="0"/>
-                <a:cs typeface="Frutiger LT Std 55 Roman" charset="0"/>
-              </a:rPr>
-              <a:t>shortener</a:t>
-            </a:r>
-            <a:endParaRPr lang="fr-CH" dirty="0" smtClean="0">
-              <a:latin typeface="Frutiger LT Std 55 Roman" charset="0"/>
-              <a:ea typeface="Frutiger LT Std 55 Roman" charset="0"/>
-              <a:cs typeface="Frutiger LT Std 55 Roman" charset="0"/>
-            </a:endParaRPr>
+              <a:t>Full user management</a:t>
+            </a:r>
           </a:p>
           <a:p>
             <a:pPr>
@@ -4331,50 +4294,22 @@
               </a:lnSpc>
             </a:pPr>
             <a:r>
-              <a:rPr lang="fr-CH" smtClean="0">
+              <a:rPr lang="fr-CH" dirty="0" smtClean="0">
                 <a:latin typeface="Frutiger LT Std 55 Roman" charset="0"/>
                 <a:ea typeface="Frutiger LT Std 55 Roman" charset="0"/>
                 <a:cs typeface="Frutiger LT Std 55 Roman" charset="0"/>
               </a:rPr>
               <a:t>Client applications</a:t>
             </a:r>
-            <a:endParaRPr lang="fr-CH" dirty="0">
-              <a:latin typeface="Frutiger LT Std 55 Roman" charset="0"/>
-              <a:ea typeface="Frutiger LT Std 55 Roman" charset="0"/>
-              <a:cs typeface="Frutiger LT Std 55 Roman" charset="0"/>
-            </a:endParaRPr>
-          </a:p>
-          <a:p>
-            <a:pPr>
+          </a:p>
+          <a:p>
+            <a:pPr marL="0" indent="0">
               <a:lnSpc>
                 <a:spcPct val="100000"/>
               </a:lnSpc>
+              <a:buNone/>
             </a:pPr>
-            <a:r>
-              <a:rPr lang="fr-CH" dirty="0" err="1" smtClean="0">
-                <a:latin typeface="Frutiger LT Std 55 Roman" charset="0"/>
-                <a:ea typeface="Frutiger LT Std 55 Roman" charset="0"/>
-                <a:cs typeface="Frutiger LT Std 55 Roman" charset="0"/>
-              </a:rPr>
-              <a:t>Deployement</a:t>
-            </a:r>
-            <a:r>
-              <a:rPr lang="fr-CH" dirty="0" smtClean="0">
-                <a:latin typeface="Frutiger LT Std 55 Roman" charset="0"/>
-                <a:ea typeface="Frutiger LT Std 55 Roman" charset="0"/>
-                <a:cs typeface="Frutiger LT Std 55 Roman" charset="0"/>
-              </a:rPr>
-              <a:t> on Amazon </a:t>
-            </a:r>
-            <a:r>
-              <a:rPr lang="fr-CH" dirty="0" err="1" smtClean="0">
-                <a:latin typeface="Frutiger LT Std 55 Roman" charset="0"/>
-                <a:ea typeface="Frutiger LT Std 55 Roman" charset="0"/>
-                <a:cs typeface="Frutiger LT Std 55 Roman" charset="0"/>
-              </a:rPr>
-              <a:t>Beanstalk</a:t>
-            </a:r>
-            <a:endParaRPr lang="fr-CH" dirty="0" smtClean="0">
+            <a:endParaRPr lang="fr-CH" dirty="0">
               <a:latin typeface="Frutiger LT Std 55 Roman" charset="0"/>
               <a:ea typeface="Frutiger LT Std 55 Roman" charset="0"/>
               <a:cs typeface="Frutiger LT Std 55 Roman" charset="0"/>
@@ -5185,7 +5120,7 @@
           <a:p>
             <a:fld id="{C43896F1-9A2E-4F71-89E3-643EA97C0F02}" type="datetime2">
               <a:rPr lang="en-US" smtClean="0"/>
-              <a:t>Sunday, December 6, 2015</a:t>
+              <a:t>Monday, December 7, 2015</a:t>
             </a:fld>
             <a:endParaRPr lang="en-US" dirty="0"/>
           </a:p>
@@ -5384,7 +5319,7 @@
           <a:p>
             <a:fld id="{C43896F1-9A2E-4F71-89E3-643EA97C0F02}" type="datetime2">
               <a:rPr lang="en-US" smtClean="0"/>
-              <a:t>Sunday, December 6, 2015</a:t>
+              <a:t>Monday, December 7, 2015</a:t>
             </a:fld>
             <a:endParaRPr lang="en-US" dirty="0"/>
           </a:p>
@@ -5819,7 +5754,7 @@
           <a:p>
             <a:fld id="{CB0673B8-73F1-483E-914F-97F91E35C1F7}" type="datetime2">
               <a:rPr lang="en-US" smtClean="0"/>
-              <a:t>Sunday, December 6, 2015</a:t>
+              <a:t>Monday, December 7, 2015</a:t>
             </a:fld>
             <a:endParaRPr lang="en-US" dirty="0"/>
           </a:p>
@@ -6079,11 +6014,6 @@
               </a:rPr>
               <a:t> Technologies</a:t>
             </a:r>
-            <a:endParaRPr lang="fr-CH" dirty="0" smtClean="0">
-              <a:latin typeface="Frutiger LT Std 55 Roman" charset="0"/>
-              <a:ea typeface="Frutiger LT Std 55 Roman" charset="0"/>
-              <a:cs typeface="Frutiger LT Std 55 Roman" charset="0"/>
-            </a:endParaRPr>
           </a:p>
           <a:p>
             <a:pPr>
@@ -6131,11 +6061,6 @@
               </a:rPr>
               <a:t>spects</a:t>
             </a:r>
-            <a:endParaRPr lang="fr-CH" dirty="0" smtClean="0">
-              <a:latin typeface="Frutiger LT Std 55 Roman" charset="0"/>
-              <a:ea typeface="Frutiger LT Std 55 Roman" charset="0"/>
-              <a:cs typeface="Frutiger LT Std 55 Roman" charset="0"/>
-            </a:endParaRPr>
           </a:p>
           <a:p>
             <a:pPr>
@@ -6151,11 +6076,6 @@
               </a:rPr>
               <a:t>Application Concept</a:t>
             </a:r>
-            <a:endParaRPr lang="fr-CH" dirty="0" smtClean="0">
-              <a:latin typeface="Frutiger LT Std 55 Roman" charset="0"/>
-              <a:ea typeface="Frutiger LT Std 55 Roman" charset="0"/>
-              <a:cs typeface="Frutiger LT Std 55 Roman" charset="0"/>
-            </a:endParaRPr>
           </a:p>
           <a:p>
             <a:pPr>
@@ -7155,7 +7075,7 @@
       </p:pic>
       <p:pic>
         <p:nvPicPr>
-          <p:cNvPr id="12" name="Picture 11"/>
+          <p:cNvPr id="13" name="Picture 12"/>
           <p:cNvPicPr>
             <a:picLocks noChangeAspect="1"/>
           </p:cNvPicPr>
@@ -7163,36 +7083,6 @@
         </p:nvPicPr>
         <p:blipFill>
           <a:blip r:embed="rId3">
-            <a:extLst>
-              <a:ext uri="{28A0092B-C50C-407E-A947-70E740481C1C}">
-                <a14:useLocalDpi xmlns:a14="http://schemas.microsoft.com/office/drawing/2010/main" val="0"/>
-              </a:ext>
-            </a:extLst>
-          </a:blip>
-          <a:stretch>
-            <a:fillRect/>
-          </a:stretch>
-        </p:blipFill>
-        <p:spPr>
-          <a:xfrm>
-            <a:off x="9875946" y="4012998"/>
-            <a:ext cx="1321101" cy="1412421"/>
-          </a:xfrm>
-          <a:prstGeom prst="rect">
-            <a:avLst/>
-          </a:prstGeom>
-        </p:spPr>
-      </p:pic>
-      <p:pic>
-        <p:nvPicPr>
-          <p:cNvPr id="13" name="Picture 12"/>
-          <p:cNvPicPr>
-            <a:picLocks noChangeAspect="1"/>
-          </p:cNvPicPr>
-          <p:nvPr/>
-        </p:nvPicPr>
-        <p:blipFill>
-          <a:blip r:embed="rId4">
             <a:extLst>
               <a:ext uri="{28A0092B-C50C-407E-A947-70E740481C1C}">
                 <a14:useLocalDpi xmlns:a14="http://schemas.microsoft.com/office/drawing/2010/main" val="0"/>
@@ -7222,7 +7112,7 @@
           <p:nvPr/>
         </p:nvPicPr>
         <p:blipFill>
-          <a:blip r:embed="rId5">
+          <a:blip r:embed="rId4">
             <a:extLst>
               <a:ext uri="{28A0092B-C50C-407E-A947-70E740481C1C}">
                 <a14:useLocalDpi xmlns:a14="http://schemas.microsoft.com/office/drawing/2010/main" val="0"/>
@@ -7252,7 +7142,7 @@
           <p:nvPr/>
         </p:nvPicPr>
         <p:blipFill>
-          <a:blip r:embed="rId6">
+          <a:blip r:embed="rId5">
             <a:extLst>
               <a:ext uri="{28A0092B-C50C-407E-A947-70E740481C1C}">
                 <a14:useLocalDpi xmlns:a14="http://schemas.microsoft.com/office/drawing/2010/main" val="0"/>
@@ -7282,7 +7172,7 @@
           <p:nvPr/>
         </p:nvPicPr>
         <p:blipFill>
-          <a:blip r:embed="rId7">
+          <a:blip r:embed="rId6">
             <a:extLst>
               <a:ext uri="{28A0092B-C50C-407E-A947-70E740481C1C}">
                 <a14:useLocalDpi xmlns:a14="http://schemas.microsoft.com/office/drawing/2010/main" val="0"/>
@@ -7312,7 +7202,7 @@
           <p:nvPr/>
         </p:nvPicPr>
         <p:blipFill>
-          <a:blip r:embed="rId8">
+          <a:blip r:embed="rId7">
             <a:extLst>
               <a:ext uri="{28A0092B-C50C-407E-A947-70E740481C1C}">
                 <a14:useLocalDpi xmlns:a14="http://schemas.microsoft.com/office/drawing/2010/main" val="0"/>
@@ -7340,7 +7230,7 @@
           <p:nvPr/>
         </p:nvPicPr>
         <p:blipFill rotWithShape="1">
-          <a:blip r:embed="rId9">
+          <a:blip r:embed="rId8">
             <a:extLst>
               <a:ext uri="{28A0092B-C50C-407E-A947-70E740481C1C}">
                 <a14:useLocalDpi xmlns:a14="http://schemas.microsoft.com/office/drawing/2010/main" val="0"/>
@@ -7404,6 +7294,93 @@
           </a:p>
         </p:txBody>
       </p:sp>
+      <p:grpSp>
+        <p:nvGrpSpPr>
+          <p:cNvPr id="23" name="Group 22"/>
+          <p:cNvGrpSpPr/>
+          <p:nvPr/>
+        </p:nvGrpSpPr>
+        <p:grpSpPr>
+          <a:xfrm>
+            <a:off x="9915695" y="4032923"/>
+            <a:ext cx="1130676" cy="1438189"/>
+            <a:chOff x="5934859" y="942523"/>
+            <a:chExt cx="653738" cy="831537"/>
+          </a:xfrm>
+        </p:grpSpPr>
+        <p:sp>
+          <p:nvSpPr>
+            <p:cNvPr id="24" name="TextBox 23"/>
+            <p:cNvSpPr txBox="1"/>
+            <p:nvPr/>
+          </p:nvSpPr>
+          <p:spPr>
+            <a:xfrm>
+              <a:off x="5939837" y="1618612"/>
+              <a:ext cx="643781" cy="155448"/>
+            </a:xfrm>
+            <a:prstGeom prst="rect">
+              <a:avLst/>
+            </a:prstGeom>
+            <a:noFill/>
+          </p:spPr>
+          <p:txBody>
+            <a:bodyPr wrap="square" lIns="0" tIns="0" rIns="0" bIns="0" rtlCol="0" anchor="t">
+              <a:noAutofit/>
+            </a:bodyPr>
+            <a:lstStyle/>
+            <a:p>
+              <a:pPr algn="ctr"/>
+              <a:r>
+                <a:rPr lang="en-US" sz="1200" dirty="0" smtClean="0"/>
+                <a:t>Amazon Elastic</a:t>
+              </a:r>
+              <a:br>
+                <a:rPr lang="en-US" sz="1200" dirty="0" smtClean="0"/>
+              </a:br>
+              <a:r>
+                <a:rPr lang="en-US" sz="1200" dirty="0" smtClean="0"/>
+                <a:t> </a:t>
+              </a:r>
+              <a:r>
+                <a:rPr lang="en-US" sz="1200" dirty="0" smtClean="0"/>
+                <a:t>Beanstalk</a:t>
+              </a:r>
+              <a:endParaRPr lang="en-US" sz="2800" dirty="0"/>
+            </a:p>
+          </p:txBody>
+        </p:sp>
+        <p:pic>
+          <p:nvPicPr>
+            <p:cNvPr id="25" name="Picture 24"/>
+            <p:cNvPicPr>
+              <a:picLocks noChangeAspect="1"/>
+            </p:cNvPicPr>
+            <p:nvPr/>
+          </p:nvPicPr>
+          <p:blipFill>
+            <a:blip r:embed="rId9">
+              <a:extLst>
+                <a:ext uri="{28A0092B-C50C-407E-A947-70E740481C1C}">
+                  <a14:useLocalDpi xmlns:a14="http://schemas.microsoft.com/office/drawing/2010/main" val="0"/>
+                </a:ext>
+              </a:extLst>
+            </a:blip>
+            <a:stretch>
+              <a:fillRect/>
+            </a:stretch>
+          </p:blipFill>
+          <p:spPr>
+            <a:xfrm>
+              <a:off x="5934859" y="942523"/>
+              <a:ext cx="653738" cy="653738"/>
+            </a:xfrm>
+            <a:prstGeom prst="rect">
+              <a:avLst/>
+            </a:prstGeom>
+          </p:spPr>
+        </p:pic>
+      </p:grpSp>
     </p:spTree>
     <p:extLst>
       <p:ext uri="{BB962C8B-B14F-4D97-AF65-F5344CB8AC3E}">
@@ -7462,11 +7439,7 @@
             </a:r>
             <a:r>
               <a:rPr lang="fr-CH" b="1" dirty="0" smtClean="0"/>
-              <a:t> and </a:t>
-            </a:r>
-            <a:r>
-              <a:rPr lang="fr-CH" b="1" dirty="0" smtClean="0"/>
-              <a:t>Key </a:t>
+              <a:t> and Key </a:t>
             </a:r>
             <a:r>
               <a:rPr lang="fr-CH" b="1" dirty="0"/>
@@ -8130,7 +8103,7 @@
           <a:p>
             <a:fld id="{567179FF-B5CF-4733-8008-E8A373DC24D9}" type="datetime2">
               <a:rPr lang="en-US" smtClean="0"/>
-              <a:t>Sunday, December 6, 2015</a:t>
+              <a:t>Monday, December 7, 2015</a:t>
             </a:fld>
             <a:endParaRPr lang="en-US" dirty="0"/>
           </a:p>
@@ -9810,7 +9783,7 @@
           <a:p>
             <a:fld id="{C43896F1-9A2E-4F71-89E3-643EA97C0F02}" type="datetime2">
               <a:rPr lang="en-US" smtClean="0"/>
-              <a:t>Sunday, December 6, 2015</a:t>
+              <a:t>Monday, December 7, 2015</a:t>
             </a:fld>
             <a:endParaRPr lang="en-US" dirty="0"/>
           </a:p>

</xml_diff>